<commit_message>
update files projet 5
</commit_message>
<xml_diff>
--- a/Présentation P5 - OpenClassrooms.pptx
+++ b/Présentation P5 - OpenClassrooms.pptx
@@ -5,31 +5,33 @@
     <p:sldMasterId id="2147483659" r:id="rId1"/>
   </p:sldMasterIdLst>
   <p:notesMasterIdLst>
-    <p:notesMasterId r:id="rId7"/>
+    <p:notesMasterId r:id="rId9"/>
   </p:notesMasterIdLst>
   <p:sldIdLst>
     <p:sldId id="256" r:id="rId2"/>
     <p:sldId id="258" r:id="rId3"/>
     <p:sldId id="259" r:id="rId4"/>
-    <p:sldId id="260" r:id="rId5"/>
-    <p:sldId id="261" r:id="rId6"/>
+    <p:sldId id="262" r:id="rId5"/>
+    <p:sldId id="260" r:id="rId6"/>
+    <p:sldId id="261" r:id="rId7"/>
+    <p:sldId id="263" r:id="rId8"/>
   </p:sldIdLst>
   <p:sldSz cx="12192000" cy="6858000"/>
   <p:notesSz cx="6858000" cy="9144000"/>
   <p:embeddedFontLst>
     <p:embeddedFont>
       <p:font typeface="Calibri" panose="020F0502020204030204" pitchFamily="34" charset="0"/>
-      <p:regular r:id="rId8"/>
-      <p:bold r:id="rId9"/>
-      <p:italic r:id="rId10"/>
-      <p:boldItalic r:id="rId11"/>
+      <p:regular r:id="rId10"/>
+      <p:bold r:id="rId11"/>
+      <p:italic r:id="rId12"/>
+      <p:boldItalic r:id="rId13"/>
     </p:embeddedFont>
     <p:embeddedFont>
       <p:font typeface="Quattrocento Sans" panose="020B0604020202020204" charset="0"/>
-      <p:regular r:id="rId12"/>
-      <p:bold r:id="rId13"/>
-      <p:italic r:id="rId14"/>
-      <p:boldItalic r:id="rId15"/>
+      <p:regular r:id="rId14"/>
+      <p:bold r:id="rId15"/>
+      <p:italic r:id="rId16"/>
+      <p:boldItalic r:id="rId17"/>
     </p:embeddedFont>
   </p:embeddedFontLst>
   <p:defaultTextStyle>
@@ -11992,13 +11994,8 @@
           <a:p>
             <a:r>
               <a:rPr lang="fr-FR" dirty="0"/>
-              <a:t>Les citations sont générées aléatoirement à chaque appel </a:t>
+              <a:t>Les citations sont générées aléatoirement à chaque appel du programme.</a:t>
             </a:r>
-            <a:r>
-              <a:rPr lang="fr-FR"/>
-              <a:t>du programme.</a:t>
-            </a:r>
-            <a:endParaRPr lang="fr-FR" dirty="0"/>
           </a:p>
           <a:p>
             <a:r>
@@ -12225,7 +12222,12 @@
             <p:ph type="body" idx="1"/>
           </p:nvPr>
         </p:nvSpPr>
-        <p:spPr/>
+        <p:spPr>
+          <a:xfrm>
+            <a:off x="838200" y="1898477"/>
+            <a:ext cx="10515600" cy="4351200"/>
+          </a:xfrm>
+        </p:spPr>
         <p:txBody>
           <a:bodyPr/>
           <a:lstStyle/>
@@ -12238,6 +12240,12 @@
               <a:rPr lang="fr-FR" sz="2200" dirty="0"/>
               <a:t> : tableau avec 3 types de phrases à assembler (au total : 30 morceaux de phrases)</a:t>
             </a:r>
+          </a:p>
+          <a:p>
+            <a:pPr marL="114300" indent="0">
+              <a:buNone/>
+            </a:pPr>
+            <a:endParaRPr lang="fr-FR" sz="2200" dirty="0"/>
           </a:p>
           <a:p>
             <a:r>
@@ -12254,6 +12262,12 @@
             </a:r>
           </a:p>
           <a:p>
+            <a:pPr marL="114300" indent="0">
+              <a:buNone/>
+            </a:pPr>
+            <a:endParaRPr lang="fr-FR" sz="2200" dirty="0"/>
+          </a:p>
+          <a:p>
             <a:r>
               <a:rPr lang="fr-FR" sz="2200" b="1" u="sng" dirty="0" err="1"/>
               <a:t>getCapitalizeFirstLetter</a:t>
@@ -12268,6 +12282,12 @@
             </a:r>
           </a:p>
           <a:p>
+            <a:pPr marL="114300" indent="0">
+              <a:buNone/>
+            </a:pPr>
+            <a:endParaRPr lang="fr-FR" sz="2200" dirty="0"/>
+          </a:p>
+          <a:p>
             <a:r>
               <a:rPr lang="fr-FR" sz="2200" b="1" u="sng" dirty="0" err="1"/>
               <a:t>getRandomQuotes</a:t>
@@ -12280,52 +12300,6 @@
               <a:rPr lang="fr-FR" sz="2200" dirty="0"/>
               <a:t>: assemble les morceaux de phrases pour générer une citation</a:t>
             </a:r>
-          </a:p>
-          <a:p>
-            <a:r>
-              <a:rPr lang="fr-FR" sz="2200" b="1" u="sng" dirty="0" err="1"/>
-              <a:t>startGenerator</a:t>
-            </a:r>
-            <a:r>
-              <a:rPr lang="fr-FR" sz="2200" b="1" u="sng" dirty="0"/>
-              <a:t>()</a:t>
-            </a:r>
-            <a:r>
-              <a:rPr lang="fr-FR" sz="2200" dirty="0"/>
-              <a:t> : </a:t>
-            </a:r>
-          </a:p>
-          <a:p>
-            <a:pPr lvl="1"/>
-            <a:r>
-              <a:rPr lang="fr-FR" sz="2200" dirty="0"/>
-              <a:t>Mise en place du menu de navigation pour soit générer une citation, soit arrêter le programme</a:t>
-            </a:r>
-          </a:p>
-          <a:p>
-            <a:pPr lvl="1"/>
-            <a:r>
-              <a:rPr lang="fr-FR" sz="2200" dirty="0"/>
-              <a:t>Ajout de conditions pour vérifier si le choix est bien un nombre, compris entre 0 et 1</a:t>
-            </a:r>
-          </a:p>
-          <a:p>
-            <a:pPr lvl="1"/>
-            <a:r>
-              <a:rPr lang="fr-FR" sz="2200" dirty="0"/>
-              <a:t>Utilisation d’une boucle </a:t>
-            </a:r>
-            <a:r>
-              <a:rPr lang="fr-FR" sz="2200" dirty="0" err="1"/>
-              <a:t>while</a:t>
-            </a:r>
-            <a:r>
-              <a:rPr lang="fr-FR" sz="2200" dirty="0"/>
-              <a:t> pour que le générateur reste accessible tant que l’utilisateur saisit 1.</a:t>
-            </a:r>
-          </a:p>
-          <a:p>
-            <a:endParaRPr lang="fr-FR" sz="2200" dirty="0"/>
           </a:p>
           <a:p>
             <a:endParaRPr lang="fr-FR" sz="2200" dirty="0"/>
@@ -12346,6 +12320,312 @@
 </file>
 
 <file path=ppt/slides/slide4.xml><?xml version="1.0" encoding="utf-8"?>
+<p:sld xmlns:a="http://schemas.openxmlformats.org/drawingml/2006/main" xmlns:r="http://schemas.openxmlformats.org/officeDocument/2006/relationships" xmlns:p="http://schemas.openxmlformats.org/presentationml/2006/main">
+  <p:cSld>
+    <p:spTree>
+      <p:nvGrpSpPr>
+        <p:cNvPr id="1" name=""/>
+        <p:cNvGrpSpPr/>
+        <p:nvPr/>
+      </p:nvGrpSpPr>
+      <p:grpSpPr>
+        <a:xfrm>
+          <a:off x="0" y="0"/>
+          <a:ext cx="0" cy="0"/>
+          <a:chOff x="0" y="0"/>
+          <a:chExt cx="0" cy="0"/>
+        </a:xfrm>
+      </p:grpSpPr>
+      <p:sp>
+        <p:nvSpPr>
+          <p:cNvPr id="3" name="Espace réservé du texte 2">
+            <a:extLst>
+              <a:ext uri="{FF2B5EF4-FFF2-40B4-BE49-F238E27FC236}">
+                <a16:creationId xmlns:a16="http://schemas.microsoft.com/office/drawing/2014/main" id="{63C605C4-8F83-4AF3-B8F4-40284C077EB3}"/>
+              </a:ext>
+            </a:extLst>
+          </p:cNvPr>
+          <p:cNvSpPr>
+            <a:spLocks noGrp="1"/>
+          </p:cNvSpPr>
+          <p:nvPr>
+            <p:ph type="body" idx="1"/>
+          </p:nvPr>
+        </p:nvSpPr>
+        <p:spPr>
+          <a:xfrm>
+            <a:off x="838200" y="2034385"/>
+            <a:ext cx="10515600" cy="4351200"/>
+          </a:xfrm>
+        </p:spPr>
+        <p:txBody>
+          <a:bodyPr/>
+          <a:lstStyle/>
+          <a:p>
+            <a:r>
+              <a:rPr lang="fr-FR" sz="2200" b="1" u="sng" dirty="0" err="1"/>
+              <a:t>startGenerator</a:t>
+            </a:r>
+            <a:r>
+              <a:rPr lang="fr-FR" sz="2200" b="1" u="sng" dirty="0"/>
+              <a:t>()</a:t>
+            </a:r>
+            <a:r>
+              <a:rPr lang="fr-FR" sz="2200" dirty="0"/>
+              <a:t> : </a:t>
+            </a:r>
+          </a:p>
+          <a:p>
+            <a:pPr marL="114300" indent="0">
+              <a:buNone/>
+            </a:pPr>
+            <a:endParaRPr lang="fr-FR" sz="2200" dirty="0"/>
+          </a:p>
+          <a:p>
+            <a:pPr lvl="1"/>
+            <a:r>
+              <a:rPr lang="fr-FR" sz="2200" dirty="0"/>
+              <a:t>Mise en place du menu de navigation pour soit générer une citation, soit arrêter le programme</a:t>
+            </a:r>
+          </a:p>
+          <a:p>
+            <a:pPr marL="571500" lvl="1" indent="0">
+              <a:buNone/>
+            </a:pPr>
+            <a:endParaRPr lang="fr-FR" sz="2200" dirty="0"/>
+          </a:p>
+          <a:p>
+            <a:pPr lvl="1"/>
+            <a:r>
+              <a:rPr lang="fr-FR" sz="2200" dirty="0"/>
+              <a:t>Ajout de conditions pour vérifier si le choix est bien un nombre, compris entre 0 et 1</a:t>
+            </a:r>
+          </a:p>
+          <a:p>
+            <a:pPr marL="571500" lvl="1" indent="0">
+              <a:buNone/>
+            </a:pPr>
+            <a:endParaRPr lang="fr-FR" sz="2200" dirty="0"/>
+          </a:p>
+          <a:p>
+            <a:pPr lvl="1"/>
+            <a:r>
+              <a:rPr lang="fr-FR" sz="2200" dirty="0"/>
+              <a:t>Utilisation d’une boucle </a:t>
+            </a:r>
+            <a:r>
+              <a:rPr lang="fr-FR" sz="2200" dirty="0" err="1"/>
+              <a:t>while</a:t>
+            </a:r>
+            <a:r>
+              <a:rPr lang="fr-FR" sz="2200" dirty="0"/>
+              <a:t> pour que le générateur reste accessible tant que l’utilisateur saisit 1.</a:t>
+            </a:r>
+          </a:p>
+          <a:p>
+            <a:pPr marL="114300" indent="0">
+              <a:buNone/>
+            </a:pPr>
+            <a:endParaRPr lang="fr-FR" dirty="0"/>
+          </a:p>
+        </p:txBody>
+      </p:sp>
+      <p:sp>
+        <p:nvSpPr>
+          <p:cNvPr id="6" name="Google Shape;104;p15">
+            <a:extLst>
+              <a:ext uri="{FF2B5EF4-FFF2-40B4-BE49-F238E27FC236}">
+                <a16:creationId xmlns:a16="http://schemas.microsoft.com/office/drawing/2014/main" id="{CCD83C8C-8EFE-4FE0-A8E0-C21F78CFC008}"/>
+              </a:ext>
+            </a:extLst>
+          </p:cNvPr>
+          <p:cNvSpPr txBox="1">
+            <a:spLocks noGrp="1"/>
+          </p:cNvSpPr>
+          <p:nvPr>
+            <p:ph type="title"/>
+          </p:nvPr>
+        </p:nvSpPr>
+        <p:spPr>
+          <a:xfrm>
+            <a:off x="838200" y="964277"/>
+            <a:ext cx="10515600" cy="934200"/>
+          </a:xfrm>
+          <a:prstGeom prst="rect">
+            <a:avLst/>
+          </a:prstGeom>
+          <a:noFill/>
+          <a:ln>
+            <a:noFill/>
+          </a:ln>
+        </p:spPr>
+        <p:txBody>
+          <a:bodyPr spcFirstLastPara="1" wrap="square" lIns="91425" tIns="45700" rIns="91425" bIns="45700" anchor="ctr" anchorCtr="0">
+            <a:noAutofit/>
+          </a:bodyPr>
+          <a:lstStyle/>
+          <a:p>
+            <a:pPr marL="0" lvl="0" indent="0" algn="l" rtl="0">
+              <a:lnSpc>
+                <a:spcPct val="90000"/>
+              </a:lnSpc>
+              <a:spcBef>
+                <a:spcPts val="0"/>
+              </a:spcBef>
+              <a:spcAft>
+                <a:spcPts val="0"/>
+              </a:spcAft>
+              <a:buClr>
+                <a:schemeClr val="dk1"/>
+              </a:buClr>
+              <a:buSzPts val="3959"/>
+              <a:buFont typeface="Quattrocento Sans"/>
+              <a:buNone/>
+            </a:pPr>
+            <a:r>
+              <a:rPr lang="fr-FR" sz="3959" dirty="0">
+                <a:latin typeface="Quattrocento Sans"/>
+                <a:ea typeface="Quattrocento Sans"/>
+                <a:cs typeface="Quattrocento Sans"/>
+                <a:sym typeface="Quattrocento Sans"/>
+              </a:rPr>
+              <a:t>Caractéristiques du générateur – Etape 1</a:t>
+            </a:r>
+            <a:endParaRPr sz="1979" dirty="0">
+              <a:latin typeface="Quattrocento Sans"/>
+              <a:ea typeface="Quattrocento Sans"/>
+              <a:cs typeface="Quattrocento Sans"/>
+              <a:sym typeface="Quattrocento Sans"/>
+            </a:endParaRPr>
+          </a:p>
+        </p:txBody>
+      </p:sp>
+      <p:sp>
+        <p:nvSpPr>
+          <p:cNvPr id="7" name="Google Shape;106;p15">
+            <a:extLst>
+              <a:ext uri="{FF2B5EF4-FFF2-40B4-BE49-F238E27FC236}">
+                <a16:creationId xmlns:a16="http://schemas.microsoft.com/office/drawing/2014/main" id="{48BDF171-18C6-49D6-ABA2-A6E5C43BE4AC}"/>
+              </a:ext>
+            </a:extLst>
+          </p:cNvPr>
+          <p:cNvSpPr txBox="1"/>
+          <p:nvPr/>
+        </p:nvSpPr>
+        <p:spPr>
+          <a:xfrm>
+            <a:off x="839931" y="236741"/>
+            <a:ext cx="7380338" cy="523200"/>
+          </a:xfrm>
+          <a:prstGeom prst="rect">
+            <a:avLst/>
+          </a:prstGeom>
+          <a:noFill/>
+          <a:ln>
+            <a:noFill/>
+          </a:ln>
+        </p:spPr>
+        <p:txBody>
+          <a:bodyPr spcFirstLastPara="1" wrap="square" lIns="91425" tIns="45700" rIns="91425" bIns="45700" anchor="t" anchorCtr="0">
+            <a:noAutofit/>
+          </a:bodyPr>
+          <a:lstStyle/>
+          <a:p>
+            <a:pPr lvl="0"/>
+            <a:r>
+              <a:rPr lang="fr-FR" sz="1400" b="1" dirty="0">
+                <a:solidFill>
+                  <a:schemeClr val="dk1"/>
+                </a:solidFill>
+                <a:latin typeface="Calibri"/>
+                <a:ea typeface="Calibri"/>
+                <a:cs typeface="Calibri"/>
+                <a:sym typeface="Calibri"/>
+              </a:rPr>
+              <a:t>P5 : Imaginez un générateur de citations</a:t>
+            </a:r>
+            <a:br>
+              <a:rPr lang="fr-FR" sz="1400" b="1" dirty="0">
+                <a:solidFill>
+                  <a:schemeClr val="dk1"/>
+                </a:solidFill>
+                <a:latin typeface="Calibri"/>
+                <a:ea typeface="Calibri"/>
+                <a:cs typeface="Calibri"/>
+                <a:sym typeface="Calibri"/>
+              </a:rPr>
+            </a:br>
+            <a:r>
+              <a:rPr lang="fr-FR" sz="1400" dirty="0">
+                <a:solidFill>
+                  <a:schemeClr val="dk1"/>
+                </a:solidFill>
+                <a:latin typeface="Calibri"/>
+                <a:ea typeface="Calibri"/>
+                <a:cs typeface="Calibri"/>
+                <a:sym typeface="Calibri"/>
+              </a:rPr>
+              <a:t>Thomas Claireau – DA-Frontend</a:t>
+            </a:r>
+            <a:endParaRPr sz="1400" dirty="0">
+              <a:solidFill>
+                <a:schemeClr val="dk1"/>
+              </a:solidFill>
+              <a:latin typeface="Calibri"/>
+              <a:ea typeface="Calibri"/>
+              <a:cs typeface="Calibri"/>
+              <a:sym typeface="Calibri"/>
+            </a:endParaRPr>
+          </a:p>
+        </p:txBody>
+      </p:sp>
+      <p:pic>
+        <p:nvPicPr>
+          <p:cNvPr id="8" name="Google Shape;108;p15">
+            <a:extLst>
+              <a:ext uri="{FF2B5EF4-FFF2-40B4-BE49-F238E27FC236}">
+                <a16:creationId xmlns:a16="http://schemas.microsoft.com/office/drawing/2014/main" id="{3C8E381D-4883-48B3-9083-C1971657C5C5}"/>
+              </a:ext>
+            </a:extLst>
+          </p:cNvPr>
+          <p:cNvPicPr preferRelativeResize="0"/>
+          <p:nvPr/>
+        </p:nvPicPr>
+        <p:blipFill rotWithShape="1">
+          <a:blip r:embed="rId2">
+            <a:alphaModFix/>
+          </a:blip>
+          <a:srcRect/>
+          <a:stretch/>
+        </p:blipFill>
+        <p:spPr>
+          <a:xfrm>
+            <a:off x="10575769" y="236741"/>
+            <a:ext cx="591628" cy="591628"/>
+          </a:xfrm>
+          <a:prstGeom prst="rect">
+            <a:avLst/>
+          </a:prstGeom>
+          <a:noFill/>
+          <a:ln>
+            <a:noFill/>
+          </a:ln>
+        </p:spPr>
+      </p:pic>
+    </p:spTree>
+    <p:extLst>
+      <p:ext uri="{BB962C8B-B14F-4D97-AF65-F5344CB8AC3E}">
+        <p14:creationId xmlns:p14="http://schemas.microsoft.com/office/powerpoint/2010/main" val="3069762332"/>
+      </p:ext>
+    </p:extLst>
+  </p:cSld>
+  <p:clrMapOvr>
+    <a:masterClrMapping/>
+  </p:clrMapOvr>
+</p:sld>
+</file>
+
+<file path=ppt/slides/slide5.xml><?xml version="1.0" encoding="utf-8"?>
 <p:sld xmlns:a="http://schemas.openxmlformats.org/drawingml/2006/main" xmlns:r="http://schemas.openxmlformats.org/officeDocument/2006/relationships" xmlns:p="http://schemas.openxmlformats.org/presentationml/2006/main">
   <p:cSld>
     <p:spTree>
@@ -12558,10 +12838,22 @@
             </a:r>
           </a:p>
           <a:p>
+            <a:pPr marL="114300" indent="0">
+              <a:buNone/>
+            </a:pPr>
+            <a:endParaRPr lang="fr-FR" dirty="0"/>
+          </a:p>
+          <a:p>
             <a:r>
               <a:rPr lang="fr-FR" dirty="0"/>
               <a:t>Choisir entre 2 types de générateurs de citations (et donc deux ensembles de phrases)</a:t>
             </a:r>
+          </a:p>
+          <a:p>
+            <a:pPr marL="114300" indent="0">
+              <a:buNone/>
+            </a:pPr>
+            <a:endParaRPr lang="fr-FR" dirty="0"/>
           </a:p>
           <a:p>
             <a:r>
@@ -12584,7 +12876,7 @@
 </p:sld>
 </file>
 
-<file path=ppt/slides/slide5.xml><?xml version="1.0" encoding="utf-8"?>
+<file path=ppt/slides/slide6.xml><?xml version="1.0" encoding="utf-8"?>
 <p:sld xmlns:a="http://schemas.openxmlformats.org/drawingml/2006/main" xmlns:r="http://schemas.openxmlformats.org/officeDocument/2006/relationships" xmlns:p="http://schemas.openxmlformats.org/presentationml/2006/main">
   <p:cSld>
     <p:spTree>
@@ -12781,7 +13073,12 @@
             <p:ph type="body" idx="1"/>
           </p:nvPr>
         </p:nvSpPr>
-        <p:spPr/>
+        <p:spPr>
+          <a:xfrm>
+            <a:off x="838200" y="2270059"/>
+            <a:ext cx="10515600" cy="4351200"/>
+          </a:xfrm>
+        </p:spPr>
         <p:txBody>
           <a:bodyPr/>
           <a:lstStyle/>
@@ -12804,6 +13101,87 @@
             </a:r>
           </a:p>
           <a:p>
+            <a:pPr marL="571500" lvl="1" indent="0">
+              <a:buNone/>
+            </a:pPr>
+            <a:endParaRPr lang="fr-FR" sz="2200" dirty="0"/>
+          </a:p>
+          <a:p>
+            <a:r>
+              <a:rPr lang="fr-FR" sz="2200" b="1" u="sng" dirty="0" err="1"/>
+              <a:t>choiceNumberQuotes</a:t>
+            </a:r>
+            <a:r>
+              <a:rPr lang="fr-FR" sz="2200" dirty="0"/>
+              <a:t> : variable pour stocker le nombre de citation à générer : utilisation d’une boucle for pour répéter la fonction </a:t>
+            </a:r>
+            <a:r>
+              <a:rPr lang="fr-FR" sz="2200" b="1" u="sng" dirty="0" err="1"/>
+              <a:t>getRandomQuotes</a:t>
+            </a:r>
+            <a:r>
+              <a:rPr lang="fr-FR" sz="2200" b="1" u="sng" dirty="0"/>
+              <a:t>()</a:t>
+            </a:r>
+          </a:p>
+        </p:txBody>
+      </p:sp>
+    </p:spTree>
+    <p:extLst>
+      <p:ext uri="{BB962C8B-B14F-4D97-AF65-F5344CB8AC3E}">
+        <p14:creationId xmlns:p14="http://schemas.microsoft.com/office/powerpoint/2010/main" val="2906908284"/>
+      </p:ext>
+    </p:extLst>
+  </p:cSld>
+  <p:clrMapOvr>
+    <a:masterClrMapping/>
+  </p:clrMapOvr>
+</p:sld>
+</file>
+
+<file path=ppt/slides/slide7.xml><?xml version="1.0" encoding="utf-8"?>
+<p:sld xmlns:a="http://schemas.openxmlformats.org/drawingml/2006/main" xmlns:r="http://schemas.openxmlformats.org/officeDocument/2006/relationships" xmlns:p="http://schemas.openxmlformats.org/presentationml/2006/main">
+  <p:cSld>
+    <p:spTree>
+      <p:nvGrpSpPr>
+        <p:cNvPr id="1" name=""/>
+        <p:cNvGrpSpPr/>
+        <p:nvPr/>
+      </p:nvGrpSpPr>
+      <p:grpSpPr>
+        <a:xfrm>
+          <a:off x="0" y="0"/>
+          <a:ext cx="0" cy="0"/>
+          <a:chOff x="0" y="0"/>
+          <a:chExt cx="0" cy="0"/>
+        </a:xfrm>
+      </p:grpSpPr>
+      <p:sp>
+        <p:nvSpPr>
+          <p:cNvPr id="3" name="Espace réservé du texte 2">
+            <a:extLst>
+              <a:ext uri="{FF2B5EF4-FFF2-40B4-BE49-F238E27FC236}">
+                <a16:creationId xmlns:a16="http://schemas.microsoft.com/office/drawing/2014/main" id="{A0C44102-CEAB-439D-A1E3-95B991080EB5}"/>
+              </a:ext>
+            </a:extLst>
+          </p:cNvPr>
+          <p:cNvSpPr>
+            <a:spLocks noGrp="1"/>
+          </p:cNvSpPr>
+          <p:nvPr>
+            <p:ph type="body" idx="1"/>
+          </p:nvPr>
+        </p:nvSpPr>
+        <p:spPr>
+          <a:xfrm>
+            <a:off x="838200" y="1974914"/>
+            <a:ext cx="10515600" cy="4351200"/>
+          </a:xfrm>
+        </p:spPr>
+        <p:txBody>
+          <a:bodyPr/>
+          <a:lstStyle/>
+          <a:p>
             <a:r>
               <a:rPr lang="fr-FR" sz="2200" dirty="0"/>
               <a:t> </a:t>
@@ -12822,6 +13200,12 @@
             </a:r>
           </a:p>
           <a:p>
+            <a:pPr marL="114300" indent="0">
+              <a:buNone/>
+            </a:pPr>
+            <a:endParaRPr lang="fr-FR" sz="2200" dirty="0"/>
+          </a:p>
+          <a:p>
             <a:pPr lvl="1"/>
             <a:r>
               <a:rPr lang="fr-FR" sz="2200" dirty="0"/>
@@ -12834,6 +13218,12 @@
             <a:endParaRPr lang="fr-FR" sz="2200" dirty="0"/>
           </a:p>
           <a:p>
+            <a:pPr marL="571500" lvl="1" indent="0">
+              <a:buNone/>
+            </a:pPr>
+            <a:endParaRPr lang="fr-FR" sz="2200" dirty="0"/>
+          </a:p>
+          <a:p>
             <a:pPr lvl="1"/>
             <a:r>
               <a:rPr lang="fr-FR" sz="2200" dirty="0"/>
@@ -12841,11 +13231,23 @@
             </a:r>
           </a:p>
           <a:p>
+            <a:pPr marL="571500" lvl="1" indent="0">
+              <a:buNone/>
+            </a:pPr>
+            <a:endParaRPr lang="fr-FR" sz="2200" dirty="0"/>
+          </a:p>
+          <a:p>
             <a:pPr lvl="1"/>
             <a:r>
               <a:rPr lang="fr-FR" sz="2200" dirty="0"/>
               <a:t>0 : arrêt du programme</a:t>
             </a:r>
+          </a:p>
+          <a:p>
+            <a:pPr marL="571500" lvl="1" indent="0">
+              <a:buNone/>
+            </a:pPr>
+            <a:endParaRPr lang="fr-FR" sz="2200" dirty="0"/>
           </a:p>
           <a:p>
             <a:pPr lvl="1"/>
@@ -12863,29 +13265,196 @@
             </a:r>
           </a:p>
           <a:p>
-            <a:r>
-              <a:rPr lang="fr-FR" sz="2200" b="1" u="sng" dirty="0" err="1"/>
-              <a:t>choiceNumberQuotes</a:t>
-            </a:r>
-            <a:r>
-              <a:rPr lang="fr-FR" sz="2200" dirty="0"/>
-              <a:t> : variable pour stocker le nombre de citation à générer : utilisation d’une boucle for pour répéter la fonction </a:t>
-            </a:r>
-            <a:r>
-              <a:rPr lang="fr-FR" sz="2200" dirty="0" err="1"/>
-              <a:t>getRandomQuotes</a:t>
-            </a:r>
-            <a:r>
-              <a:rPr lang="fr-FR" sz="2200" dirty="0"/>
-              <a:t>()</a:t>
-            </a:r>
+            <a:endParaRPr lang="fr-FR" dirty="0"/>
           </a:p>
         </p:txBody>
       </p:sp>
+      <p:sp>
+        <p:nvSpPr>
+          <p:cNvPr id="4" name="Google Shape;106;p15">
+            <a:extLst>
+              <a:ext uri="{FF2B5EF4-FFF2-40B4-BE49-F238E27FC236}">
+                <a16:creationId xmlns:a16="http://schemas.microsoft.com/office/drawing/2014/main" id="{5515F850-2108-4C88-B58B-6B880B5BBD52}"/>
+              </a:ext>
+            </a:extLst>
+          </p:cNvPr>
+          <p:cNvSpPr txBox="1"/>
+          <p:nvPr/>
+        </p:nvSpPr>
+        <p:spPr>
+          <a:xfrm>
+            <a:off x="839931" y="236741"/>
+            <a:ext cx="7380338" cy="523200"/>
+          </a:xfrm>
+          <a:prstGeom prst="rect">
+            <a:avLst/>
+          </a:prstGeom>
+          <a:noFill/>
+          <a:ln>
+            <a:noFill/>
+          </a:ln>
+        </p:spPr>
+        <p:txBody>
+          <a:bodyPr spcFirstLastPara="1" wrap="square" lIns="91425" tIns="45700" rIns="91425" bIns="45700" anchor="t" anchorCtr="0">
+            <a:noAutofit/>
+          </a:bodyPr>
+          <a:lstStyle/>
+          <a:p>
+            <a:pPr lvl="0"/>
+            <a:r>
+              <a:rPr lang="fr-FR" sz="1400" b="1" dirty="0">
+                <a:solidFill>
+                  <a:schemeClr val="dk1"/>
+                </a:solidFill>
+                <a:latin typeface="Calibri"/>
+                <a:ea typeface="Calibri"/>
+                <a:cs typeface="Calibri"/>
+                <a:sym typeface="Calibri"/>
+              </a:rPr>
+              <a:t>P5 : Imaginez un générateur de citations</a:t>
+            </a:r>
+            <a:br>
+              <a:rPr lang="fr-FR" sz="1400" b="1" dirty="0">
+                <a:solidFill>
+                  <a:schemeClr val="dk1"/>
+                </a:solidFill>
+                <a:latin typeface="Calibri"/>
+                <a:ea typeface="Calibri"/>
+                <a:cs typeface="Calibri"/>
+                <a:sym typeface="Calibri"/>
+              </a:rPr>
+            </a:br>
+            <a:r>
+              <a:rPr lang="fr-FR" sz="1400" dirty="0">
+                <a:solidFill>
+                  <a:schemeClr val="dk1"/>
+                </a:solidFill>
+                <a:latin typeface="Calibri"/>
+                <a:ea typeface="Calibri"/>
+                <a:cs typeface="Calibri"/>
+                <a:sym typeface="Calibri"/>
+              </a:rPr>
+              <a:t>Thomas Claireau – DA-Frontend</a:t>
+            </a:r>
+            <a:endParaRPr sz="1400" dirty="0">
+              <a:solidFill>
+                <a:schemeClr val="dk1"/>
+              </a:solidFill>
+              <a:latin typeface="Calibri"/>
+              <a:ea typeface="Calibri"/>
+              <a:cs typeface="Calibri"/>
+              <a:sym typeface="Calibri"/>
+            </a:endParaRPr>
+          </a:p>
+        </p:txBody>
+      </p:sp>
+      <p:sp>
+        <p:nvSpPr>
+          <p:cNvPr id="7" name="Google Shape;104;p15">
+            <a:extLst>
+              <a:ext uri="{FF2B5EF4-FFF2-40B4-BE49-F238E27FC236}">
+                <a16:creationId xmlns:a16="http://schemas.microsoft.com/office/drawing/2014/main" id="{7488B5E7-25FE-4DB0-9303-61FBB1056F6D}"/>
+              </a:ext>
+            </a:extLst>
+          </p:cNvPr>
+          <p:cNvSpPr txBox="1">
+            <a:spLocks noGrp="1"/>
+          </p:cNvSpPr>
+          <p:nvPr>
+            <p:ph type="title"/>
+          </p:nvPr>
+        </p:nvSpPr>
+        <p:spPr>
+          <a:xfrm>
+            <a:off x="838200" y="964277"/>
+            <a:ext cx="10515600" cy="934200"/>
+          </a:xfrm>
+          <a:prstGeom prst="rect">
+            <a:avLst/>
+          </a:prstGeom>
+          <a:noFill/>
+          <a:ln>
+            <a:noFill/>
+          </a:ln>
+        </p:spPr>
+        <p:txBody>
+          <a:bodyPr spcFirstLastPara="1" wrap="square" lIns="91425" tIns="45700" rIns="91425" bIns="45700" anchor="ctr" anchorCtr="0">
+            <a:noAutofit/>
+          </a:bodyPr>
+          <a:lstStyle/>
+          <a:p>
+            <a:pPr marL="0" lvl="0" indent="0" algn="l" rtl="0">
+              <a:lnSpc>
+                <a:spcPct val="90000"/>
+              </a:lnSpc>
+              <a:spcBef>
+                <a:spcPts val="0"/>
+              </a:spcBef>
+              <a:spcAft>
+                <a:spcPts val="0"/>
+              </a:spcAft>
+              <a:buClr>
+                <a:schemeClr val="dk1"/>
+              </a:buClr>
+              <a:buSzPts val="3959"/>
+              <a:buFont typeface="Quattrocento Sans"/>
+              <a:buNone/>
+            </a:pPr>
+            <a:r>
+              <a:rPr lang="fr-FR" sz="3959" dirty="0">
+                <a:latin typeface="Quattrocento Sans"/>
+                <a:ea typeface="Quattrocento Sans"/>
+                <a:cs typeface="Quattrocento Sans"/>
+                <a:sym typeface="Quattrocento Sans"/>
+              </a:rPr>
+              <a:t>Caractéristiques du générateur – Etape 2</a:t>
+            </a:r>
+            <a:endParaRPr sz="1979" dirty="0">
+              <a:latin typeface="Quattrocento Sans"/>
+              <a:ea typeface="Quattrocento Sans"/>
+              <a:cs typeface="Quattrocento Sans"/>
+              <a:sym typeface="Quattrocento Sans"/>
+            </a:endParaRPr>
+          </a:p>
+        </p:txBody>
+      </p:sp>
+      <p:pic>
+        <p:nvPicPr>
+          <p:cNvPr id="8" name="Google Shape;108;p15">
+            <a:extLst>
+              <a:ext uri="{FF2B5EF4-FFF2-40B4-BE49-F238E27FC236}">
+                <a16:creationId xmlns:a16="http://schemas.microsoft.com/office/drawing/2014/main" id="{64FD2B87-E990-45F9-98A2-FC258F107BEB}"/>
+              </a:ext>
+            </a:extLst>
+          </p:cNvPr>
+          <p:cNvPicPr preferRelativeResize="0"/>
+          <p:nvPr/>
+        </p:nvPicPr>
+        <p:blipFill rotWithShape="1">
+          <a:blip r:embed="rId2">
+            <a:alphaModFix/>
+          </a:blip>
+          <a:srcRect/>
+          <a:stretch/>
+        </p:blipFill>
+        <p:spPr>
+          <a:xfrm>
+            <a:off x="10575769" y="236741"/>
+            <a:ext cx="591628" cy="591628"/>
+          </a:xfrm>
+          <a:prstGeom prst="rect">
+            <a:avLst/>
+          </a:prstGeom>
+          <a:noFill/>
+          <a:ln>
+            <a:noFill/>
+          </a:ln>
+        </p:spPr>
+      </p:pic>
     </p:spTree>
     <p:extLst>
       <p:ext uri="{BB962C8B-B14F-4D97-AF65-F5344CB8AC3E}">
-        <p14:creationId xmlns:p14="http://schemas.microsoft.com/office/powerpoint/2010/main" val="2906908284"/>
+        <p14:creationId xmlns:p14="http://schemas.microsoft.com/office/powerpoint/2010/main" val="1769765573"/>
       </p:ext>
     </p:extLst>
   </p:cSld>

</xml_diff>